<commit_message>
ultimas correções e geração de pdf para o ppt
</commit_message>
<xml_diff>
--- a/Teste de Software - Final .pptx
+++ b/Teste de Software - Final .pptx
@@ -396,7 +396,7 @@
           <a:p>
             <a:fld id="{397E0307-B85C-446A-8EF0-0407D435D787}" type="datetimeFigureOut">
               <a:rPr lang="en-US" dirty="0"/>
-              <a:t>6/20/2022</a:t>
+              <a:t>6/21/2022</a:t>
             </a:fld>
             <a:endParaRPr lang="en-US" dirty="0"/>
           </a:p>
@@ -805,7 +805,7 @@
           <a:p>
             <a:fld id="{8BD862E7-95FA-4FC4-9EC5-DDBFA8DC7417}" type="datetimeFigureOut">
               <a:rPr lang="en-US" dirty="0"/>
-              <a:t>6/20/2022</a:t>
+              <a:t>6/21/2022</a:t>
             </a:fld>
             <a:endParaRPr lang="en-US" dirty="0"/>
           </a:p>
@@ -1136,7 +1136,7 @@
           <a:p>
             <a:fld id="{8DB987F2-A784-4F72-BB57-0E9EACDE722E}" type="datetimeFigureOut">
               <a:rPr lang="en-US" dirty="0"/>
-              <a:t>6/20/2022</a:t>
+              <a:t>6/21/2022</a:t>
             </a:fld>
             <a:endParaRPr lang="en-US" dirty="0"/>
           </a:p>
@@ -1536,7 +1536,7 @@
           <a:p>
             <a:fld id="{40BBD51E-4B19-444E-85C0-DBD7EB6263F4}" type="datetimeFigureOut">
               <a:rPr lang="en-US" dirty="0"/>
-              <a:t>6/20/2022</a:t>
+              <a:t>6/21/2022</a:t>
             </a:fld>
             <a:endParaRPr lang="en-US" dirty="0"/>
           </a:p>
@@ -2099,7 +2099,7 @@
           <a:p>
             <a:fld id="{F0D7255A-4AD5-4D3E-9A0A-689DA3BA976C}" type="datetimeFigureOut">
               <a:rPr lang="en-US" dirty="0"/>
-              <a:t>6/20/2022</a:t>
+              <a:t>6/21/2022</a:t>
             </a:fld>
             <a:endParaRPr lang="en-US" dirty="0"/>
           </a:p>
@@ -2775,7 +2775,7 @@
           <a:p>
             <a:fld id="{3EE0AD15-87AC-45B2-9EE5-8D165AF83CD7}" type="datetimeFigureOut">
               <a:rPr lang="en-US" dirty="0"/>
-              <a:t>6/20/2022</a:t>
+              <a:t>6/21/2022</a:t>
             </a:fld>
             <a:endParaRPr lang="en-US" dirty="0"/>
           </a:p>
@@ -3683,7 +3683,7 @@
           <a:p>
             <a:fld id="{FCC40CCD-F0D6-4CC2-A4C8-2D7D0D875F02}" type="datetimeFigureOut">
               <a:rPr lang="en-US" dirty="0"/>
-              <a:t>6/20/2022</a:t>
+              <a:t>6/21/2022</a:t>
             </a:fld>
             <a:endParaRPr lang="en-US" dirty="0"/>
           </a:p>
@@ -3991,7 +3991,7 @@
           <a:p>
             <a:fld id="{B3CFE2CC-454D-4466-AC55-B86DA0A87BAE}" type="datetimeFigureOut">
               <a:rPr lang="en-US" dirty="0"/>
-              <a:t>6/20/2022</a:t>
+              <a:t>6/21/2022</a:t>
             </a:fld>
             <a:endParaRPr lang="en-US" dirty="0"/>
           </a:p>
@@ -4250,7 +4250,7 @@
           <a:p>
             <a:fld id="{B647B1BF-4039-460D-A637-65428CBD720E}" type="datetimeFigureOut">
               <a:rPr lang="en-US" dirty="0"/>
-              <a:t>6/20/2022</a:t>
+              <a:t>6/21/2022</a:t>
             </a:fld>
             <a:endParaRPr lang="en-US" dirty="0"/>
           </a:p>
@@ -4569,7 +4569,7 @@
           <a:p>
             <a:fld id="{AAA39ACE-9343-4EBE-B5CA-AEA240A1DC53}" type="datetimeFigureOut">
               <a:rPr lang="en-US" dirty="0"/>
-              <a:t>6/20/2022</a:t>
+              <a:t>6/21/2022</a:t>
             </a:fld>
             <a:endParaRPr lang="en-US" dirty="0"/>
           </a:p>
@@ -4953,7 +4953,7 @@
           <a:p>
             <a:fld id="{C9A00F7B-89C5-4DF7-A309-6263220147D4}" type="datetimeFigureOut">
               <a:rPr lang="en-US" dirty="0"/>
-              <a:t>6/20/2022</a:t>
+              <a:t>6/21/2022</a:t>
             </a:fld>
             <a:endParaRPr lang="en-US" dirty="0"/>
           </a:p>
@@ -5324,7 +5324,7 @@
           <a:p>
             <a:fld id="{449C95DE-FD64-4606-AE61-EC1136867CC6}" type="datetimeFigureOut">
               <a:rPr lang="en-US" dirty="0"/>
-              <a:t>6/20/2022</a:t>
+              <a:t>6/21/2022</a:t>
             </a:fld>
             <a:endParaRPr lang="en-US" dirty="0"/>
           </a:p>
@@ -5825,7 +5825,7 @@
           <a:p>
             <a:fld id="{5DEB0BBD-30FE-4CF1-900A-0C45149F8AF8}" type="datetimeFigureOut">
               <a:rPr lang="en-US" dirty="0"/>
-              <a:t>6/20/2022</a:t>
+              <a:t>6/21/2022</a:t>
             </a:fld>
             <a:endParaRPr lang="en-US" dirty="0"/>
           </a:p>
@@ -6077,7 +6077,7 @@
           <a:p>
             <a:fld id="{B91A5F7F-3E81-4C65-A4D1-CB62D5B9DB91}" type="datetimeFigureOut">
               <a:rPr lang="en-US" dirty="0"/>
-              <a:t>6/20/2022</a:t>
+              <a:t>6/21/2022</a:t>
             </a:fld>
             <a:endParaRPr lang="en-US" dirty="0"/>
           </a:p>
@@ -6235,7 +6235,7 @@
           <a:p>
             <a:fld id="{377ECC86-1672-4627-AEFE-EC5485C73905}" type="datetimeFigureOut">
               <a:rPr lang="en-US" dirty="0"/>
-              <a:t>6/20/2022</a:t>
+              <a:t>6/21/2022</a:t>
             </a:fld>
             <a:endParaRPr lang="en-US" dirty="0"/>
           </a:p>
@@ -6620,7 +6620,7 @@
           <a:p>
             <a:fld id="{3CDCB01F-D966-4C62-B900-0BE008A90C98}" type="datetimeFigureOut">
               <a:rPr lang="en-US" dirty="0"/>
-              <a:t>6/20/2022</a:t>
+              <a:t>6/21/2022</a:t>
             </a:fld>
             <a:endParaRPr lang="en-US" dirty="0"/>
           </a:p>
@@ -7024,7 +7024,7 @@
           <a:p>
             <a:fld id="{5E73A0EA-7DC7-4964-BB97-B173EF3B859A}" type="datetimeFigureOut">
               <a:rPr lang="en-US" dirty="0"/>
-              <a:t>6/20/2022</a:t>
+              <a:t>6/21/2022</a:t>
             </a:fld>
             <a:endParaRPr lang="en-US" dirty="0"/>
           </a:p>
@@ -7263,7 +7263,7 @@
           <a:p>
             <a:fld id="{30EF52CC-F3D9-41D4-BCE4-C208E61A3F31}" type="datetimeFigureOut">
               <a:rPr lang="en-US" dirty="0"/>
-              <a:t>6/20/2022</a:t>
+              <a:t>6/21/2022</a:t>
             </a:fld>
             <a:endParaRPr lang="en-US" dirty="0"/>
           </a:p>

</xml_diff>